<commit_message>
[main] Update Part.1.2. and English version of Part.2.3, 4.
</commit_message>
<xml_diff>
--- a/Resources/Part1/Part1_HelloCube.pptx
+++ b/Resources/Part1/Part1_HelloCube.pptx
@@ -261,7 +261,7 @@
           <a:p>
             <a:fld id="{1A086832-2622-4354-BD9D-64D40320B320}" type="datetimeFigureOut">
               <a:rPr kumimoji="1" lang="ja-JP" altLang="en-US" smtClean="0"/>
-              <a:t>2024/9/29</a:t>
+              <a:t>2024/10/1</a:t>
             </a:fld>
             <a:endParaRPr kumimoji="1" lang="ja-JP" altLang="en-US"/>
           </a:p>
@@ -491,7 +491,7 @@
           <a:p>
             <a:fld id="{1A086832-2622-4354-BD9D-64D40320B320}" type="datetimeFigureOut">
               <a:rPr kumimoji="1" lang="ja-JP" altLang="en-US" smtClean="0"/>
-              <a:t>2024/9/29</a:t>
+              <a:t>2024/10/1</a:t>
             </a:fld>
             <a:endParaRPr kumimoji="1" lang="ja-JP" altLang="en-US"/>
           </a:p>
@@ -731,7 +731,7 @@
           <a:p>
             <a:fld id="{1A086832-2622-4354-BD9D-64D40320B320}" type="datetimeFigureOut">
               <a:rPr kumimoji="1" lang="ja-JP" altLang="en-US" smtClean="0"/>
-              <a:t>2024/9/29</a:t>
+              <a:t>2024/10/1</a:t>
             </a:fld>
             <a:endParaRPr kumimoji="1" lang="ja-JP" altLang="en-US"/>
           </a:p>
@@ -961,7 +961,7 @@
           <a:p>
             <a:fld id="{1A086832-2622-4354-BD9D-64D40320B320}" type="datetimeFigureOut">
               <a:rPr kumimoji="1" lang="ja-JP" altLang="en-US" smtClean="0"/>
-              <a:t>2024/9/29</a:t>
+              <a:t>2024/10/1</a:t>
             </a:fld>
             <a:endParaRPr kumimoji="1" lang="ja-JP" altLang="en-US"/>
           </a:p>
@@ -1236,7 +1236,7 @@
           <a:p>
             <a:fld id="{1A086832-2622-4354-BD9D-64D40320B320}" type="datetimeFigureOut">
               <a:rPr kumimoji="1" lang="ja-JP" altLang="en-US" smtClean="0"/>
-              <a:t>2024/9/29</a:t>
+              <a:t>2024/10/1</a:t>
             </a:fld>
             <a:endParaRPr kumimoji="1" lang="ja-JP" altLang="en-US"/>
           </a:p>
@@ -1565,7 +1565,7 @@
           <a:p>
             <a:fld id="{1A086832-2622-4354-BD9D-64D40320B320}" type="datetimeFigureOut">
               <a:rPr kumimoji="1" lang="ja-JP" altLang="en-US" smtClean="0"/>
-              <a:t>2024/9/29</a:t>
+              <a:t>2024/10/1</a:t>
             </a:fld>
             <a:endParaRPr kumimoji="1" lang="ja-JP" altLang="en-US"/>
           </a:p>
@@ -2041,7 +2041,7 @@
           <a:p>
             <a:fld id="{1A086832-2622-4354-BD9D-64D40320B320}" type="datetimeFigureOut">
               <a:rPr kumimoji="1" lang="ja-JP" altLang="en-US" smtClean="0"/>
-              <a:t>2024/9/29</a:t>
+              <a:t>2024/10/1</a:t>
             </a:fld>
             <a:endParaRPr kumimoji="1" lang="ja-JP" altLang="en-US"/>
           </a:p>
@@ -2182,7 +2182,7 @@
           <a:p>
             <a:fld id="{1A086832-2622-4354-BD9D-64D40320B320}" type="datetimeFigureOut">
               <a:rPr kumimoji="1" lang="ja-JP" altLang="en-US" smtClean="0"/>
-              <a:t>2024/9/29</a:t>
+              <a:t>2024/10/1</a:t>
             </a:fld>
             <a:endParaRPr kumimoji="1" lang="ja-JP" altLang="en-US"/>
           </a:p>
@@ -2295,7 +2295,7 @@
           <a:p>
             <a:fld id="{1A086832-2622-4354-BD9D-64D40320B320}" type="datetimeFigureOut">
               <a:rPr kumimoji="1" lang="ja-JP" altLang="en-US" smtClean="0"/>
-              <a:t>2024/9/29</a:t>
+              <a:t>2024/10/1</a:t>
             </a:fld>
             <a:endParaRPr kumimoji="1" lang="ja-JP" altLang="en-US"/>
           </a:p>
@@ -2638,7 +2638,7 @@
           <a:p>
             <a:fld id="{1A086832-2622-4354-BD9D-64D40320B320}" type="datetimeFigureOut">
               <a:rPr kumimoji="1" lang="ja-JP" altLang="en-US" smtClean="0"/>
-              <a:t>2024/9/29</a:t>
+              <a:t>2024/10/1</a:t>
             </a:fld>
             <a:endParaRPr kumimoji="1" lang="ja-JP" altLang="en-US"/>
           </a:p>
@@ -2926,7 +2926,7 @@
           <a:p>
             <a:fld id="{1A086832-2622-4354-BD9D-64D40320B320}" type="datetimeFigureOut">
               <a:rPr kumimoji="1" lang="ja-JP" altLang="en-US" smtClean="0"/>
-              <a:t>2024/9/29</a:t>
+              <a:t>2024/10/1</a:t>
             </a:fld>
             <a:endParaRPr kumimoji="1" lang="ja-JP" altLang="en-US"/>
           </a:p>
@@ -3199,7 +3199,7 @@
           <a:p>
             <a:fld id="{1A086832-2622-4354-BD9D-64D40320B320}" type="datetimeFigureOut">
               <a:rPr kumimoji="1" lang="ja-JP" altLang="en-US" smtClean="0"/>
-              <a:t>2024/9/29</a:t>
+              <a:t>2024/10/1</a:t>
             </a:fld>
             <a:endParaRPr kumimoji="1" lang="ja-JP" altLang="en-US"/>
           </a:p>
@@ -4288,8 +4288,8 @@
         </p:blipFill>
         <p:spPr>
           <a:xfrm>
-            <a:off x="894623" y="1623410"/>
-            <a:ext cx="10402752" cy="4248743"/>
+            <a:off x="2018748" y="2264893"/>
+            <a:ext cx="7065049" cy="2885542"/>
           </a:xfrm>
           <a:prstGeom prst="rect">
             <a:avLst/>
@@ -4348,8 +4348,8 @@
         </p:nvSpPr>
         <p:spPr>
           <a:xfrm>
-            <a:off x="990239" y="3064214"/>
-            <a:ext cx="1324945" cy="184825"/>
+            <a:off x="2114026" y="3196309"/>
+            <a:ext cx="824477" cy="180579"/>
           </a:xfrm>
           <a:prstGeom prst="rect">
             <a:avLst/>
@@ -4404,8 +4404,8 @@
         </p:nvCxnSpPr>
         <p:spPr>
           <a:xfrm rot="16200000" flipH="1">
-            <a:off x="2953951" y="1947799"/>
-            <a:ext cx="139430" cy="2741909"/>
+            <a:off x="3436776" y="2466376"/>
+            <a:ext cx="90290" cy="1911313"/>
           </a:xfrm>
           <a:prstGeom prst="curvedConnector2">
             <a:avLst/>
@@ -4447,8 +4447,8 @@
         </p:nvSpPr>
         <p:spPr>
           <a:xfrm>
-            <a:off x="4394621" y="3255524"/>
-            <a:ext cx="618336" cy="265889"/>
+            <a:off x="4437578" y="3376888"/>
+            <a:ext cx="352651" cy="180579"/>
           </a:xfrm>
           <a:prstGeom prst="rect">
             <a:avLst/>
@@ -4503,13 +4503,13 @@
         </p:nvCxnSpPr>
         <p:spPr>
           <a:xfrm rot="5400000" flipH="1" flipV="1">
-            <a:off x="4695448" y="2120864"/>
-            <a:ext cx="1408889" cy="1392209"/>
+            <a:off x="4671808" y="2534205"/>
+            <a:ext cx="965357" cy="1081167"/>
           </a:xfrm>
           <a:prstGeom prst="curvedConnector4">
             <a:avLst>
-              <a:gd name="adj1" fmla="val -16226"/>
-              <a:gd name="adj2" fmla="val 61103"/>
+              <a:gd name="adj1" fmla="val -23680"/>
+              <a:gd name="adj2" fmla="val 58154"/>
             </a:avLst>
           </a:prstGeom>
           <a:ln w="19050">
@@ -4549,8 +4549,8 @@
         </p:nvSpPr>
         <p:spPr>
           <a:xfrm>
-            <a:off x="6095998" y="1958503"/>
-            <a:ext cx="2940997" cy="308042"/>
+            <a:off x="5695071" y="2487506"/>
+            <a:ext cx="1677316" cy="209207"/>
           </a:xfrm>
           <a:prstGeom prst="rect">
             <a:avLst/>
@@ -4601,8 +4601,8 @@
         </p:nvSpPr>
         <p:spPr>
           <a:xfrm>
-            <a:off x="9036995" y="5457217"/>
-            <a:ext cx="1147865" cy="308042"/>
+            <a:off x="7568923" y="4865518"/>
+            <a:ext cx="761345" cy="232633"/>
           </a:xfrm>
           <a:prstGeom prst="rect">
             <a:avLst/>
@@ -4653,8 +4653,8 @@
         </p:nvSpPr>
         <p:spPr>
           <a:xfrm>
-            <a:off x="3155006" y="5453974"/>
-            <a:ext cx="979249" cy="308042"/>
+            <a:off x="3606691" y="4848740"/>
+            <a:ext cx="604583" cy="232633"/>
           </a:xfrm>
           <a:prstGeom prst="rect">
             <a:avLst/>
@@ -4709,8 +4709,8 @@
         </p:nvCxnSpPr>
         <p:spPr>
           <a:xfrm rot="16200000" flipH="1">
-            <a:off x="6629400" y="3203642"/>
-            <a:ext cx="3344693" cy="1470498"/>
+            <a:off x="5908765" y="3321677"/>
+            <a:ext cx="2285122" cy="1035194"/>
           </a:xfrm>
           <a:prstGeom prst="curvedConnector2">
             <a:avLst/>
@@ -4756,14 +4756,14 @@
         </p:nvCxnSpPr>
         <p:spPr>
           <a:xfrm rot="5400000" flipH="1">
-            <a:off x="6472137" y="2626469"/>
-            <a:ext cx="311285" cy="5966297"/>
+            <a:off x="5804584" y="2953140"/>
+            <a:ext cx="249411" cy="4040613"/>
           </a:xfrm>
           <a:prstGeom prst="curvedConnector5">
             <a:avLst>
-              <a:gd name="adj1" fmla="val -73438"/>
-              <a:gd name="adj2" fmla="val 50707"/>
-              <a:gd name="adj3" fmla="val 173438"/>
+              <a:gd name="adj1" fmla="val -91656"/>
+              <a:gd name="adj2" fmla="val 50970"/>
+              <a:gd name="adj3" fmla="val 191656"/>
             </a:avLst>
           </a:prstGeom>
           <a:ln w="19050">

</xml_diff>